<commit_message>
Added the docs link to the razor page tutorial.
</commit_message>
<xml_diff>
--- a/deck/ASP.NETCore_Beginners.pptx
+++ b/deck/ASP.NETCore_Beginners.pptx
@@ -8076,7 +8076,7 @@
         <p:spPr>
           <a:xfrm>
             <a:off x="269239" y="1189177"/>
-            <a:ext cx="11653523" cy="4961358"/>
+            <a:ext cx="11653523" cy="5503045"/>
           </a:xfrm>
         </p:spPr>
         <p:txBody>
@@ -8104,6 +8104,27 @@
             </a:r>
           </a:p>
           <a:p>
+            <a:r>
+              <a:rPr lang="en-US" sz="3200" dirty="0">
+                <a:hlinkClick r:id="rId3"/>
+              </a:rPr>
+              <a:t>Getting started with </a:t>
+            </a:r>
+            <a:r>
+              <a:rPr lang="en-US" sz="3200" dirty="0" err="1">
+                <a:hlinkClick r:id="rId3"/>
+              </a:rPr>
+              <a:t>Razorpages</a:t>
+            </a:r>
+            <a:r>
+              <a:rPr lang="en-US" sz="3200" dirty="0">
+                <a:hlinkClick r:id="rId3"/>
+              </a:rPr>
+              <a:t> </a:t>
+            </a:r>
+            <a:endParaRPr lang="en-US" sz="3200" dirty="0"/>
+          </a:p>
+          <a:p>
             <a:pPr marL="0" indent="0">
               <a:buNone/>
             </a:pPr>
@@ -8119,7 +8140,7 @@
             </a:r>
             <a:r>
               <a:rPr lang="en-US" sz="3200" dirty="0">
-                <a:hlinkClick r:id="rId3"/>
+                <a:hlinkClick r:id="rId4"/>
               </a:rPr>
               <a:t>docs.microsoft.com</a:t>
             </a:r>
@@ -8128,7 +8149,7 @@
           <a:p>
             <a:r>
               <a:rPr lang="en-US" sz="3200" dirty="0">
-                <a:hlinkClick r:id="rId4"/>
+                <a:hlinkClick r:id="rId5"/>
               </a:rPr>
               <a:t>dot.net </a:t>
             </a:r>
@@ -8149,7 +8170,7 @@
           <a:p>
             <a:r>
               <a:rPr lang="en-US" sz="3200" dirty="0">
-                <a:hlinkClick r:id="rId5"/>
+                <a:hlinkClick r:id="rId6"/>
               </a:rPr>
               <a:t>.NET Foundation </a:t>
             </a:r>
@@ -8158,7 +8179,7 @@
           <a:p>
             <a:r>
               <a:rPr lang="en-US" sz="3200" dirty="0">
-                <a:hlinkClick r:id="rId6"/>
+                <a:hlinkClick r:id="rId7"/>
               </a:rPr>
               <a:t>Twitch Channels  </a:t>
             </a:r>

</xml_diff>